<commit_message>
Documentation and diagram edits
</commit_message>
<xml_diff>
--- a/docs/diagrams/QuickDocsDiagrams.pptx
+++ b/docs/diagrams/QuickDocsDiagrams.pptx
@@ -4911,8 +4911,8 @@
         </p:nvSpPr>
         <p:spPr>
           <a:xfrm>
-            <a:off x="3302807" y="2804383"/>
-            <a:ext cx="1367682" cy="246221"/>
+            <a:off x="4819197" y="2345775"/>
+            <a:ext cx="1340862" cy="230832"/>
           </a:xfrm>
           <a:prstGeom prst="rect">
             <a:avLst/>
@@ -4920,16 +4920,16 @@
           <a:noFill/>
         </p:spPr>
         <p:txBody>
-          <a:bodyPr wrap="none" rtlCol="0">
+          <a:bodyPr wrap="square" rtlCol="0">
             <a:spAutoFit/>
           </a:bodyPr>
           <a:lstStyle/>
           <a:p>
             <a:r>
-              <a:rPr lang="en-SG" sz="1000" dirty="0" err="1" smtClean="0"/>
+              <a:rPr lang="en-SG" sz="900" dirty="0" err="1" smtClean="0"/>
               <a:t>consultationCommand</a:t>
             </a:r>
-            <a:endParaRPr lang="en-SG" sz="1000" dirty="0"/>
+            <a:endParaRPr lang="en-SG" sz="900" dirty="0"/>
           </a:p>
         </p:txBody>
       </p:sp>
@@ -5706,36 +5706,6 @@
             <a:r>
               <a:rPr lang="en-SG" sz="1000" dirty="0" err="1" smtClean="0"/>
               <a:t>commandResult</a:t>
-            </a:r>
-            <a:endParaRPr lang="en-SG" sz="1000" dirty="0"/>
-          </a:p>
-        </p:txBody>
-      </p:sp>
-      <p:sp>
-        <p:nvSpPr>
-          <p:cNvPr id="101" name="TextBox 100"/>
-          <p:cNvSpPr txBox="1"/>
-          <p:nvPr/>
-        </p:nvSpPr>
-        <p:spPr>
-          <a:xfrm>
-            <a:off x="6412635" y="4368910"/>
-            <a:ext cx="559769" cy="246221"/>
-          </a:xfrm>
-          <a:prstGeom prst="rect">
-            <a:avLst/>
-          </a:prstGeom>
-          <a:noFill/>
-        </p:spPr>
-        <p:txBody>
-          <a:bodyPr wrap="none" rtlCol="0">
-            <a:spAutoFit/>
-          </a:bodyPr>
-          <a:lstStyle/>
-          <a:p>
-            <a:r>
-              <a:rPr lang="en-SG" sz="1000" dirty="0" smtClean="0"/>
-              <a:t>patient</a:t>
             </a:r>
             <a:endParaRPr lang="en-SG" sz="1000" dirty="0"/>
           </a:p>
@@ -7252,7 +7222,7 @@
         </p:nvSpPr>
         <p:spPr>
           <a:xfrm>
-            <a:off x="3302807" y="2804383"/>
+            <a:off x="4860095" y="2357288"/>
             <a:ext cx="1213794" cy="246221"/>
           </a:xfrm>
           <a:prstGeom prst="rect">
@@ -7754,8 +7724,8 @@
         </p:nvSpPr>
         <p:spPr>
           <a:xfrm>
-            <a:off x="7198657" y="3917263"/>
-            <a:ext cx="160343" cy="697868"/>
+            <a:off x="7215048" y="3917262"/>
+            <a:ext cx="143952" cy="979119"/>
           </a:xfrm>
           <a:prstGeom prst="rect">
             <a:avLst/>
@@ -7875,7 +7845,7 @@
         </p:nvSpPr>
         <p:spPr>
           <a:xfrm>
-            <a:off x="3314873" y="4933080"/>
+            <a:off x="3466847" y="4945553"/>
             <a:ext cx="1178439" cy="246221"/>
           </a:xfrm>
           <a:prstGeom prst="rect">
@@ -7905,8 +7875,8 @@
         </p:nvSpPr>
         <p:spPr>
           <a:xfrm>
-            <a:off x="8748922" y="3972965"/>
-            <a:ext cx="114592" cy="444937"/>
+            <a:off x="8768772" y="3972965"/>
+            <a:ext cx="94742" cy="642166"/>
           </a:xfrm>
           <a:prstGeom prst="rect">
             <a:avLst/>
@@ -8081,6 +8051,168 @@
                 <a:srgbClr val="7030A0"/>
               </a:solidFill>
             </a:endParaRPr>
+          </a:p>
+        </p:txBody>
+      </p:sp>
+      <p:cxnSp>
+        <p:nvCxnSpPr>
+          <p:cNvPr id="50" name="Straight Arrow Connector 49"/>
+          <p:cNvCxnSpPr/>
+          <p:nvPr/>
+        </p:nvCxnSpPr>
+        <p:spPr>
+          <a:xfrm flipH="1">
+            <a:off x="8877270" y="4400831"/>
+            <a:ext cx="1174552" cy="0"/>
+          </a:xfrm>
+          <a:prstGeom prst="straightConnector1">
+            <a:avLst/>
+          </a:prstGeom>
+          <a:ln w="12700">
+            <a:solidFill>
+              <a:srgbClr val="7030A0"/>
+            </a:solidFill>
+            <a:prstDash val="dash"/>
+            <a:headEnd type="none" w="med" len="med"/>
+            <a:tailEnd type="arrow" w="med" len="med"/>
+          </a:ln>
+        </p:spPr>
+        <p:style>
+          <a:lnRef idx="1">
+            <a:schemeClr val="accent1"/>
+          </a:lnRef>
+          <a:fillRef idx="0">
+            <a:schemeClr val="accent1"/>
+          </a:fillRef>
+          <a:effectRef idx="0">
+            <a:schemeClr val="accent1"/>
+          </a:effectRef>
+          <a:fontRef idx="minor">
+            <a:schemeClr val="tx1"/>
+          </a:fontRef>
+        </p:style>
+      </p:cxnSp>
+      <p:cxnSp>
+        <p:nvCxnSpPr>
+          <p:cNvPr id="54" name="Straight Arrow Connector 53"/>
+          <p:cNvCxnSpPr/>
+          <p:nvPr/>
+        </p:nvCxnSpPr>
+        <p:spPr>
+          <a:xfrm flipH="1">
+            <a:off x="7391853" y="4615131"/>
+            <a:ext cx="1376919" cy="0"/>
+          </a:xfrm>
+          <a:prstGeom prst="straightConnector1">
+            <a:avLst/>
+          </a:prstGeom>
+          <a:ln w="12700">
+            <a:solidFill>
+              <a:srgbClr val="7030A0"/>
+            </a:solidFill>
+            <a:prstDash val="dash"/>
+            <a:headEnd type="none" w="med" len="med"/>
+            <a:tailEnd type="arrow" w="med" len="med"/>
+          </a:ln>
+        </p:spPr>
+        <p:style>
+          <a:lnRef idx="1">
+            <a:schemeClr val="accent1"/>
+          </a:lnRef>
+          <a:fillRef idx="0">
+            <a:schemeClr val="accent1"/>
+          </a:fillRef>
+          <a:effectRef idx="0">
+            <a:schemeClr val="accent1"/>
+          </a:effectRef>
+          <a:fontRef idx="minor">
+            <a:schemeClr val="tx1"/>
+          </a:fontRef>
+        </p:style>
+      </p:cxnSp>
+      <p:cxnSp>
+        <p:nvCxnSpPr>
+          <p:cNvPr id="56" name="Straight Arrow Connector 55"/>
+          <p:cNvCxnSpPr/>
+          <p:nvPr/>
+        </p:nvCxnSpPr>
+        <p:spPr>
+          <a:xfrm flipH="1">
+            <a:off x="6104138" y="4896381"/>
+            <a:ext cx="1174552" cy="0"/>
+          </a:xfrm>
+          <a:prstGeom prst="straightConnector1">
+            <a:avLst/>
+          </a:prstGeom>
+          <a:ln w="12700">
+            <a:solidFill>
+              <a:srgbClr val="7030A0"/>
+            </a:solidFill>
+            <a:prstDash val="dash"/>
+            <a:headEnd type="none" w="med" len="med"/>
+            <a:tailEnd type="arrow" w="med" len="med"/>
+          </a:ln>
+        </p:spPr>
+        <p:style>
+          <a:lnRef idx="1">
+            <a:schemeClr val="accent1"/>
+          </a:lnRef>
+          <a:fillRef idx="0">
+            <a:schemeClr val="accent1"/>
+          </a:fillRef>
+          <a:effectRef idx="0">
+            <a:schemeClr val="accent1"/>
+          </a:effectRef>
+          <a:fontRef idx="minor">
+            <a:schemeClr val="tx1"/>
+          </a:fontRef>
+        </p:style>
+      </p:cxnSp>
+      <p:sp>
+        <p:nvSpPr>
+          <p:cNvPr id="59" name="Rectangle 58"/>
+          <p:cNvSpPr/>
+          <p:nvPr/>
+        </p:nvSpPr>
+        <p:spPr>
+          <a:xfrm>
+            <a:off x="10018207" y="4078510"/>
+            <a:ext cx="73294" cy="340251"/>
+          </a:xfrm>
+          <a:prstGeom prst="rect">
+            <a:avLst/>
+          </a:prstGeom>
+          <a:solidFill>
+            <a:srgbClr val="7030A0"/>
+          </a:solidFill>
+          <a:ln>
+            <a:solidFill>
+              <a:srgbClr val="7030A0"/>
+            </a:solidFill>
+          </a:ln>
+        </p:spPr>
+        <p:style>
+          <a:lnRef idx="2">
+            <a:schemeClr val="accent1">
+              <a:shade val="50000"/>
+            </a:schemeClr>
+          </a:lnRef>
+          <a:fillRef idx="1">
+            <a:schemeClr val="accent1"/>
+          </a:fillRef>
+          <a:effectRef idx="0">
+            <a:schemeClr val="accent1"/>
+          </a:effectRef>
+          <a:fontRef idx="minor">
+            <a:schemeClr val="lt1"/>
+          </a:fontRef>
+        </p:style>
+        <p:txBody>
+          <a:bodyPr rtlCol="0" anchor="ctr"/>
+          <a:lstStyle/>
+          <a:p>
+            <a:pPr algn="ctr"/>
+            <a:endParaRPr lang="en-SG"/>
           </a:p>
         </p:txBody>
       </p:sp>
@@ -9563,8 +9695,8 @@
         </p:nvSpPr>
         <p:spPr>
           <a:xfrm>
-            <a:off x="7198657" y="3917263"/>
-            <a:ext cx="160343" cy="697868"/>
+            <a:off x="7189073" y="3917262"/>
+            <a:ext cx="169927" cy="860925"/>
           </a:xfrm>
           <a:prstGeom prst="rect">
             <a:avLst/>
@@ -9714,8 +9846,8 @@
         </p:nvSpPr>
         <p:spPr>
           <a:xfrm>
-            <a:off x="8748922" y="3972965"/>
-            <a:ext cx="114592" cy="444937"/>
+            <a:off x="8768772" y="3972965"/>
+            <a:ext cx="94742" cy="595615"/>
           </a:xfrm>
           <a:prstGeom prst="rect">
             <a:avLst/>
@@ -9895,6 +10027,168 @@
                 <a:srgbClr val="7030A0"/>
               </a:solidFill>
             </a:endParaRPr>
+          </a:p>
+        </p:txBody>
+      </p:sp>
+      <p:cxnSp>
+        <p:nvCxnSpPr>
+          <p:cNvPr id="45" name="Straight Arrow Connector 44"/>
+          <p:cNvCxnSpPr/>
+          <p:nvPr/>
+        </p:nvCxnSpPr>
+        <p:spPr>
+          <a:xfrm flipH="1">
+            <a:off x="8877270" y="4400831"/>
+            <a:ext cx="1174552" cy="0"/>
+          </a:xfrm>
+          <a:prstGeom prst="straightConnector1">
+            <a:avLst/>
+          </a:prstGeom>
+          <a:ln w="12700">
+            <a:solidFill>
+              <a:srgbClr val="7030A0"/>
+            </a:solidFill>
+            <a:prstDash val="dash"/>
+            <a:headEnd type="none" w="med" len="med"/>
+            <a:tailEnd type="arrow" w="med" len="med"/>
+          </a:ln>
+        </p:spPr>
+        <p:style>
+          <a:lnRef idx="1">
+            <a:schemeClr val="accent1"/>
+          </a:lnRef>
+          <a:fillRef idx="0">
+            <a:schemeClr val="accent1"/>
+          </a:fillRef>
+          <a:effectRef idx="0">
+            <a:schemeClr val="accent1"/>
+          </a:effectRef>
+          <a:fontRef idx="minor">
+            <a:schemeClr val="tx1"/>
+          </a:fontRef>
+        </p:style>
+      </p:cxnSp>
+      <p:cxnSp>
+        <p:nvCxnSpPr>
+          <p:cNvPr id="49" name="Straight Arrow Connector 48"/>
+          <p:cNvCxnSpPr/>
+          <p:nvPr/>
+        </p:nvCxnSpPr>
+        <p:spPr>
+          <a:xfrm flipH="1">
+            <a:off x="7382438" y="4568580"/>
+            <a:ext cx="1386334" cy="0"/>
+          </a:xfrm>
+          <a:prstGeom prst="straightConnector1">
+            <a:avLst/>
+          </a:prstGeom>
+          <a:ln w="12700">
+            <a:solidFill>
+              <a:srgbClr val="7030A0"/>
+            </a:solidFill>
+            <a:prstDash val="dash"/>
+            <a:headEnd type="none" w="med" len="med"/>
+            <a:tailEnd type="arrow" w="med" len="med"/>
+          </a:ln>
+        </p:spPr>
+        <p:style>
+          <a:lnRef idx="1">
+            <a:schemeClr val="accent1"/>
+          </a:lnRef>
+          <a:fillRef idx="0">
+            <a:schemeClr val="accent1"/>
+          </a:fillRef>
+          <a:effectRef idx="0">
+            <a:schemeClr val="accent1"/>
+          </a:effectRef>
+          <a:fontRef idx="minor">
+            <a:schemeClr val="tx1"/>
+          </a:fontRef>
+        </p:style>
+      </p:cxnSp>
+      <p:cxnSp>
+        <p:nvCxnSpPr>
+          <p:cNvPr id="50" name="Straight Arrow Connector 49"/>
+          <p:cNvCxnSpPr/>
+          <p:nvPr/>
+        </p:nvCxnSpPr>
+        <p:spPr>
+          <a:xfrm flipH="1">
+            <a:off x="6124777" y="4778187"/>
+            <a:ext cx="1174552" cy="0"/>
+          </a:xfrm>
+          <a:prstGeom prst="straightConnector1">
+            <a:avLst/>
+          </a:prstGeom>
+          <a:ln w="12700">
+            <a:solidFill>
+              <a:srgbClr val="7030A0"/>
+            </a:solidFill>
+            <a:prstDash val="dash"/>
+            <a:headEnd type="none" w="med" len="med"/>
+            <a:tailEnd type="arrow" w="med" len="med"/>
+          </a:ln>
+        </p:spPr>
+        <p:style>
+          <a:lnRef idx="1">
+            <a:schemeClr val="accent1"/>
+          </a:lnRef>
+          <a:fillRef idx="0">
+            <a:schemeClr val="accent1"/>
+          </a:fillRef>
+          <a:effectRef idx="0">
+            <a:schemeClr val="accent1"/>
+          </a:effectRef>
+          <a:fontRef idx="minor">
+            <a:schemeClr val="tx1"/>
+          </a:fontRef>
+        </p:style>
+      </p:cxnSp>
+      <p:sp>
+        <p:nvSpPr>
+          <p:cNvPr id="54" name="Rectangle 53"/>
+          <p:cNvSpPr/>
+          <p:nvPr/>
+        </p:nvSpPr>
+        <p:spPr>
+          <a:xfrm>
+            <a:off x="10018207" y="4078510"/>
+            <a:ext cx="73294" cy="340251"/>
+          </a:xfrm>
+          <a:prstGeom prst="rect">
+            <a:avLst/>
+          </a:prstGeom>
+          <a:solidFill>
+            <a:srgbClr val="7030A0"/>
+          </a:solidFill>
+          <a:ln>
+            <a:solidFill>
+              <a:srgbClr val="7030A0"/>
+            </a:solidFill>
+          </a:ln>
+        </p:spPr>
+        <p:style>
+          <a:lnRef idx="2">
+            <a:schemeClr val="accent1">
+              <a:shade val="50000"/>
+            </a:schemeClr>
+          </a:lnRef>
+          <a:fillRef idx="1">
+            <a:schemeClr val="accent1"/>
+          </a:fillRef>
+          <a:effectRef idx="0">
+            <a:schemeClr val="accent1"/>
+          </a:effectRef>
+          <a:fontRef idx="minor">
+            <a:schemeClr val="lt1"/>
+          </a:fontRef>
+        </p:style>
+        <p:txBody>
+          <a:bodyPr rtlCol="0" anchor="ctr"/>
+          <a:lstStyle/>
+          <a:p>
+            <a:pPr algn="ctr"/>
+            <a:endParaRPr lang="en-SG"/>
           </a:p>
         </p:txBody>
       </p:sp>
@@ -11741,6 +12035,155 @@
           </a:p>
         </p:txBody>
       </p:sp>
+      <p:cxnSp>
+        <p:nvCxnSpPr>
+          <p:cNvPr id="41" name="Straight Arrow Connector 40"/>
+          <p:cNvCxnSpPr/>
+          <p:nvPr/>
+        </p:nvCxnSpPr>
+        <p:spPr>
+          <a:xfrm flipH="1" flipV="1">
+            <a:off x="1664996" y="5378105"/>
+            <a:ext cx="8574102" cy="28929"/>
+          </a:xfrm>
+          <a:prstGeom prst="straightConnector1">
+            <a:avLst/>
+          </a:prstGeom>
+          <a:ln w="12700">
+            <a:solidFill>
+              <a:srgbClr val="ED7D31"/>
+            </a:solidFill>
+            <a:prstDash val="dash"/>
+            <a:headEnd type="none" w="med" len="med"/>
+            <a:tailEnd type="arrow" w="med" len="med"/>
+          </a:ln>
+        </p:spPr>
+        <p:style>
+          <a:lnRef idx="1">
+            <a:schemeClr val="accent1"/>
+          </a:lnRef>
+          <a:fillRef idx="0">
+            <a:schemeClr val="accent1"/>
+          </a:fillRef>
+          <a:effectRef idx="0">
+            <a:schemeClr val="accent1"/>
+          </a:effectRef>
+          <a:fontRef idx="minor">
+            <a:schemeClr val="tx1"/>
+          </a:fontRef>
+        </p:style>
+      </p:cxnSp>
+      <p:cxnSp>
+        <p:nvCxnSpPr>
+          <p:cNvPr id="42" name="Straight Arrow Connector 41"/>
+          <p:cNvCxnSpPr/>
+          <p:nvPr/>
+        </p:nvCxnSpPr>
+        <p:spPr>
+          <a:xfrm flipH="1">
+            <a:off x="7377099" y="3430152"/>
+            <a:ext cx="1423857" cy="0"/>
+          </a:xfrm>
+          <a:prstGeom prst="straightConnector1">
+            <a:avLst/>
+          </a:prstGeom>
+          <a:ln w="12700">
+            <a:solidFill>
+              <a:srgbClr val="7030A0"/>
+            </a:solidFill>
+            <a:prstDash val="dash"/>
+            <a:headEnd type="none" w="med" len="med"/>
+            <a:tailEnd type="arrow" w="med" len="med"/>
+          </a:ln>
+        </p:spPr>
+        <p:style>
+          <a:lnRef idx="1">
+            <a:schemeClr val="accent1"/>
+          </a:lnRef>
+          <a:fillRef idx="0">
+            <a:schemeClr val="accent1"/>
+          </a:fillRef>
+          <a:effectRef idx="0">
+            <a:schemeClr val="accent1"/>
+          </a:effectRef>
+          <a:fontRef idx="minor">
+            <a:schemeClr val="tx1"/>
+          </a:fontRef>
+        </p:style>
+      </p:cxnSp>
+      <p:cxnSp>
+        <p:nvCxnSpPr>
+          <p:cNvPr id="45" name="Straight Arrow Connector 44"/>
+          <p:cNvCxnSpPr/>
+          <p:nvPr/>
+        </p:nvCxnSpPr>
+        <p:spPr>
+          <a:xfrm flipH="1">
+            <a:off x="4934705" y="3641446"/>
+            <a:ext cx="2282051" cy="0"/>
+          </a:xfrm>
+          <a:prstGeom prst="straightConnector1">
+            <a:avLst/>
+          </a:prstGeom>
+          <a:ln w="12700">
+            <a:solidFill>
+              <a:srgbClr val="7030A0"/>
+            </a:solidFill>
+            <a:prstDash val="dash"/>
+            <a:headEnd type="none" w="med" len="med"/>
+            <a:tailEnd type="arrow" w="med" len="med"/>
+          </a:ln>
+        </p:spPr>
+        <p:style>
+          <a:lnRef idx="1">
+            <a:schemeClr val="accent1"/>
+          </a:lnRef>
+          <a:fillRef idx="0">
+            <a:schemeClr val="accent1"/>
+          </a:fillRef>
+          <a:effectRef idx="0">
+            <a:schemeClr val="accent1"/>
+          </a:effectRef>
+          <a:fontRef idx="minor">
+            <a:schemeClr val="tx1"/>
+          </a:fontRef>
+        </p:style>
+      </p:cxnSp>
+      <p:cxnSp>
+        <p:nvCxnSpPr>
+          <p:cNvPr id="49" name="Straight Arrow Connector 48"/>
+          <p:cNvCxnSpPr/>
+          <p:nvPr/>
+        </p:nvCxnSpPr>
+        <p:spPr>
+          <a:xfrm flipH="1" flipV="1">
+            <a:off x="1687517" y="2340097"/>
+            <a:ext cx="1359893" cy="13505"/>
+          </a:xfrm>
+          <a:prstGeom prst="straightConnector1">
+            <a:avLst/>
+          </a:prstGeom>
+          <a:ln w="12700">
+            <a:prstDash val="dash"/>
+            <a:headEnd type="none" w="med" len="med"/>
+            <a:tailEnd type="arrow" w="med" len="med"/>
+          </a:ln>
+        </p:spPr>
+        <p:style>
+          <a:lnRef idx="1">
+            <a:schemeClr val="accent1"/>
+          </a:lnRef>
+          <a:fillRef idx="0">
+            <a:schemeClr val="accent1"/>
+          </a:fillRef>
+          <a:effectRef idx="0">
+            <a:schemeClr val="accent1"/>
+          </a:effectRef>
+          <a:fontRef idx="minor">
+            <a:schemeClr val="tx1"/>
+          </a:fontRef>
+        </p:style>
+      </p:cxnSp>
     </p:spTree>
     <p:extLst>
       <p:ext uri="{BB962C8B-B14F-4D97-AF65-F5344CB8AC3E}">

</xml_diff>